<commit_message>
Adding Royce's version of PPT v2
</commit_message>
<xml_diff>
--- a/docs/cs207-presentation_royce.pptx
+++ b/docs/cs207-presentation_royce.pptx
@@ -1096,16 +1096,11 @@
             </a:r>
             <a:r>
               <a:rPr lang="en-US" dirty="0"/>
-              <a:t> of code between both implementations - the forward mode determines the derivatives of the variables using the chain rule whereas reverse mode traverses the computational graph in the forward pass and stores both parent-child relationships and the partial </a:t>
-            </a:r>
-            <a:r>
-              <a:rPr lang="en-US"/>
-              <a:t>derivatives without </a:t>
-            </a:r>
-            <a:r>
-              <a:rPr lang="en-US" dirty="0"/>
-              <a:t>doing the chain rule.</a:t>
-            </a:r>
+              <a:t> of code between both implementations - the forward mode determines the derivatives of the variables using the chain rule whereas reverse mode traverses the computational graph in the forward pass and stores both parent-child relationships and the partial derivatives without doing the chain rule.ls</a:t>
+            </a:r>
+          </a:p>
+          <a:p>
+            <a:endParaRPr lang="en-US" dirty="0"/>
           </a:p>
         </p:txBody>
       </p:sp>
@@ -15173,8 +15168,8 @@
         </p:nvSpPr>
         <p:spPr>
           <a:xfrm>
-            <a:off x="6236972" y="2536448"/>
-            <a:ext cx="5353048" cy="1785104"/>
+            <a:off x="6332220" y="2103510"/>
+            <a:ext cx="5257800" cy="3000821"/>
           </a:xfrm>
           <a:prstGeom prst="rect">
             <a:avLst/>
@@ -15195,7 +15190,7 @@
               <a:buChar char="•"/>
             </a:pPr>
             <a:r>
-              <a:rPr lang="en-US" altLang="zh-CN" sz="2000" dirty="0">
+              <a:rPr lang="en-US" altLang="zh-CN" sz="2400" dirty="0">
                 <a:solidFill>
                   <a:schemeClr val="bg2">
                     <a:lumMod val="25000"/>
@@ -15206,7 +15201,7 @@
               </a:rPr>
               <a:t>Single AutoDiff.py module </a:t>
             </a:r>
-            <a:endParaRPr lang="en-US" sz="2000" dirty="0">
+            <a:endParaRPr lang="en-US" sz="2400" dirty="0">
               <a:solidFill>
                 <a:schemeClr val="bg2">
                   <a:lumMod val="25000"/>
@@ -15225,7 +15220,7 @@
               <a:buChar char="•"/>
             </a:pPr>
             <a:r>
-              <a:rPr lang="en-US" sz="2000" dirty="0">
+              <a:rPr lang="en-US" sz="2400" dirty="0">
                 <a:solidFill>
                   <a:schemeClr val="bg2">
                     <a:lumMod val="25000"/>
@@ -15237,7 +15232,7 @@
               <a:t>Two classes: </a:t>
             </a:r>
             <a:r>
-              <a:rPr lang="en-US" sz="2000" dirty="0" err="1">
+              <a:rPr lang="en-US" sz="2400" dirty="0" err="1">
                 <a:solidFill>
                   <a:schemeClr val="bg2">
                     <a:lumMod val="25000"/>
@@ -15249,7 +15244,7 @@
               <a:t>Ad_Var</a:t>
             </a:r>
             <a:r>
-              <a:rPr lang="en-US" sz="2000" dirty="0">
+              <a:rPr lang="en-US" sz="2400" dirty="0">
                 <a:solidFill>
                   <a:schemeClr val="bg2">
                     <a:lumMod val="25000"/>
@@ -15261,7 +15256,7 @@
               <a:t> and </a:t>
             </a:r>
             <a:r>
-              <a:rPr lang="en-US" sz="2000" dirty="0" err="1">
+              <a:rPr lang="en-US" sz="2400" dirty="0" err="1">
                 <a:solidFill>
                   <a:schemeClr val="bg2">
                     <a:lumMod val="25000"/>
@@ -15272,7 +15267,7 @@
               </a:rPr>
               <a:t>rAd_Var</a:t>
             </a:r>
-            <a:endParaRPr lang="en-US" sz="2000" dirty="0">
+            <a:endParaRPr lang="en-US" sz="2400" dirty="0">
               <a:solidFill>
                 <a:schemeClr val="bg2">
                   <a:lumMod val="25000"/>
@@ -15291,7 +15286,7 @@
               <a:buChar char="•"/>
             </a:pPr>
             <a:r>
-              <a:rPr lang="en-US" altLang="zh-CN" sz="2000" dirty="0">
+              <a:rPr lang="en-US" altLang="zh-CN" sz="2400" dirty="0">
                 <a:solidFill>
                   <a:schemeClr val="bg2">
                     <a:lumMod val="25000"/>
@@ -15300,7 +15295,28 @@
                 <a:latin typeface="Times New Roman" panose="02020603050405020304" pitchFamily="18" charset="0"/>
                 <a:cs typeface="Times New Roman" panose="02020603050405020304" pitchFamily="18" charset="0"/>
               </a:rPr>
-              <a:t>Difference in implementation; limited reusability of code</a:t>
+              <a:t>Flexibility to choose between forward and reverse mode</a:t>
+            </a:r>
+          </a:p>
+          <a:p>
+            <a:pPr indent="-285750">
+              <a:spcBef>
+                <a:spcPts val="1800"/>
+              </a:spcBef>
+              <a:buFont typeface="Arial" panose="020B0604020202020204" pitchFamily="34" charset="0"/>
+              <a:buChar char="•"/>
+            </a:pPr>
+            <a:r>
+              <a:rPr lang="en-US" altLang="zh-CN" sz="2400" dirty="0">
+                <a:solidFill>
+                  <a:schemeClr val="bg2">
+                    <a:lumMod val="25000"/>
+                  </a:schemeClr>
+                </a:solidFill>
+                <a:latin typeface="Times New Roman" panose="02020603050405020304" pitchFamily="18" charset="0"/>
+                <a:cs typeface="Times New Roman" panose="02020603050405020304" pitchFamily="18" charset="0"/>
+              </a:rPr>
+              <a:t>Difference in implementation = limited reusability of code between classes</a:t>
             </a:r>
           </a:p>
         </p:txBody>

</xml_diff>